<commit_message>
updated dom's version to take github's data structure
</commit_message>
<xml_diff>
--- a/hivprogression/peer-seminar.pptx
+++ b/hivprogression/peer-seminar.pptx
@@ -6414,56 +6414,233 @@
           </a:p>
         </p:txBody>
       </p:sp>
-      <p:sp>
-        <p:nvSpPr>
-          <p:cNvPr id="4" name="Content Placeholder 3">
+      <p:pic>
+        <p:nvPicPr>
+          <p:cNvPr id="6" name="Content Placeholder 5">
             <a:extLst>
               <a:ext uri="{FF2B5EF4-FFF2-40B4-BE49-F238E27FC236}">
-                <a16:creationId xmlns:a16="http://schemas.microsoft.com/office/drawing/2014/main" id="{2FCF1BFA-FE18-4541-9126-C6C0C788BE77}"/>
+                <a16:creationId xmlns:a16="http://schemas.microsoft.com/office/drawing/2014/main" id="{A6FCE498-128F-42EA-8C30-CE645F54F4D2}"/>
               </a:ext>
             </a:extLst>
           </p:cNvPr>
-          <p:cNvSpPr>
-            <a:spLocks noGrp="1"/>
-          </p:cNvSpPr>
+          <p:cNvPicPr>
+            <a:picLocks noGrp="1" noChangeAspect="1"/>
+          </p:cNvPicPr>
           <p:nvPr>
             <p:ph sz="half" idx="1"/>
           </p:nvPr>
-        </p:nvSpPr>
-        <p:spPr/>
-        <p:txBody>
-          <a:bodyPr/>
-          <a:lstStyle/>
-          <a:p>
-            <a:endParaRPr lang="en-US"/>
-          </a:p>
-        </p:txBody>
-      </p:sp>
-      <p:sp>
-        <p:nvSpPr>
-          <p:cNvPr id="5" name="Content Placeholder 4">
+        </p:nvPicPr>
+        <p:blipFill rotWithShape="1">
+          <a:blip r:embed="rId3"/>
+          <a:srcRect b="30495"/>
+          <a:stretch/>
+        </p:blipFill>
+        <p:spPr>
+          <a:xfrm>
+            <a:off x="6194843" y="1965960"/>
+            <a:ext cx="4686954" cy="2456502"/>
+          </a:xfrm>
+          <a:prstGeom prst="rect">
+            <a:avLst/>
+          </a:prstGeom>
+        </p:spPr>
+      </p:pic>
+      <p:pic>
+        <p:nvPicPr>
+          <p:cNvPr id="3" name="Content Placeholder 2">
             <a:extLst>
               <a:ext uri="{FF2B5EF4-FFF2-40B4-BE49-F238E27FC236}">
-                <a16:creationId xmlns:a16="http://schemas.microsoft.com/office/drawing/2014/main" id="{F49DAD2B-4ADC-47BA-9ED4-218B5A8E2B92}"/>
+                <a16:creationId xmlns:a16="http://schemas.microsoft.com/office/drawing/2014/main" id="{5318C8D8-AE0D-49AD-B44B-8052ADB87595}"/>
               </a:ext>
             </a:extLst>
           </p:cNvPr>
-          <p:cNvSpPr>
-            <a:spLocks noGrp="1"/>
-          </p:cNvSpPr>
+          <p:cNvPicPr>
+            <a:picLocks noGrp="1" noChangeAspect="1"/>
+          </p:cNvPicPr>
           <p:nvPr>
             <p:ph sz="half" idx="2"/>
           </p:nvPr>
-        </p:nvSpPr>
-        <p:spPr/>
-        <p:txBody>
-          <a:bodyPr/>
-          <a:lstStyle/>
-          <a:p>
-            <a:endParaRPr lang="en-US"/>
-          </a:p>
-        </p:txBody>
-      </p:sp>
+        </p:nvPicPr>
+        <p:blipFill rotWithShape="1">
+          <a:blip r:embed="rId4"/>
+          <a:srcRect l="4564"/>
+          <a:stretch/>
+        </p:blipFill>
+        <p:spPr>
+          <a:xfrm>
+            <a:off x="1143000" y="4674770"/>
+            <a:ext cx="9738797" cy="1573630"/>
+          </a:xfrm>
+          <a:prstGeom prst="rect">
+            <a:avLst/>
+          </a:prstGeom>
+        </p:spPr>
+      </p:pic>
+      <p:sp>
+        <p:nvSpPr>
+          <p:cNvPr id="7" name="TextBox 6">
+            <a:extLst>
+              <a:ext uri="{FF2B5EF4-FFF2-40B4-BE49-F238E27FC236}">
+                <a16:creationId xmlns:a16="http://schemas.microsoft.com/office/drawing/2014/main" id="{13E98F50-B41E-42B2-A36D-0AF897FF7368}"/>
+              </a:ext>
+            </a:extLst>
+          </p:cNvPr>
+          <p:cNvSpPr txBox="1"/>
+          <p:nvPr/>
+        </p:nvSpPr>
+        <p:spPr>
+          <a:xfrm>
+            <a:off x="1173480" y="1965960"/>
+            <a:ext cx="4686954" cy="2031325"/>
+          </a:xfrm>
+          <a:prstGeom prst="rect">
+            <a:avLst/>
+          </a:prstGeom>
+          <a:noFill/>
+        </p:spPr>
+        <p:txBody>
+          <a:bodyPr wrap="square" rtlCol="0">
+            <a:spAutoFit/>
+          </a:bodyPr>
+          <a:lstStyle/>
+          <a:p>
+            <a:r>
+              <a:rPr lang="en-US" dirty="0"/>
+              <a:t>Accuracy of best model:</a:t>
+            </a:r>
+          </a:p>
+          <a:p>
+            <a:pPr marL="285750" indent="-285750">
+              <a:buFont typeface="Arial" panose="020B0604020202020204" pitchFamily="34" charset="0"/>
+              <a:buChar char="•"/>
+            </a:pPr>
+            <a:r>
+              <a:rPr lang="en-US" dirty="0"/>
+              <a:t>Train: 85%</a:t>
+            </a:r>
+          </a:p>
+          <a:p>
+            <a:pPr marL="285750" indent="-285750">
+              <a:buFont typeface="Arial" panose="020B0604020202020204" pitchFamily="34" charset="0"/>
+              <a:buChar char="•"/>
+            </a:pPr>
+            <a:r>
+              <a:rPr lang="en-US" dirty="0"/>
+              <a:t>Test: 57%</a:t>
+            </a:r>
+          </a:p>
+          <a:p>
+            <a:pPr marL="285750" indent="-285750">
+              <a:buFont typeface="Arial" panose="020B0604020202020204" pitchFamily="34" charset="0"/>
+              <a:buChar char="•"/>
+            </a:pPr>
+            <a:endParaRPr lang="en-US" dirty="0"/>
+          </a:p>
+          <a:p>
+            <a:r>
+              <a:rPr lang="en-US" dirty="0"/>
+              <a:t>Most important features </a:t>
+            </a:r>
+            <a:endParaRPr lang="en-US" dirty="0">
+              <a:sym typeface="Wingdings" panose="05000000000000000000" pitchFamily="2" charset="2"/>
+            </a:endParaRPr>
+          </a:p>
+          <a:p>
+            <a:endParaRPr lang="en-US" dirty="0">
+              <a:sym typeface="Wingdings" panose="05000000000000000000" pitchFamily="2" charset="2"/>
+            </a:endParaRPr>
+          </a:p>
+          <a:p>
+            <a:r>
+              <a:rPr lang="en-US" dirty="0">
+                <a:sym typeface="Wingdings" panose="05000000000000000000" pitchFamily="2" charset="2"/>
+              </a:rPr>
+              <a:t>Data structure used</a:t>
+            </a:r>
+            <a:endParaRPr lang="en-US" dirty="0"/>
+          </a:p>
+        </p:txBody>
+      </p:sp>
+      <p:cxnSp>
+        <p:nvCxnSpPr>
+          <p:cNvPr id="9" name="Straight Arrow Connector 8">
+            <a:extLst>
+              <a:ext uri="{FF2B5EF4-FFF2-40B4-BE49-F238E27FC236}">
+                <a16:creationId xmlns:a16="http://schemas.microsoft.com/office/drawing/2014/main" id="{F6CF1187-2780-442E-9AD3-5BD274EEFEB9}"/>
+              </a:ext>
+            </a:extLst>
+          </p:cNvPr>
+          <p:cNvCxnSpPr>
+            <a:cxnSpLocks/>
+          </p:cNvCxnSpPr>
+          <p:nvPr/>
+        </p:nvCxnSpPr>
+        <p:spPr>
+          <a:xfrm>
+            <a:off x="2170757" y="3997285"/>
+            <a:ext cx="0" cy="458218"/>
+          </a:xfrm>
+          <a:prstGeom prst="straightConnector1">
+            <a:avLst/>
+          </a:prstGeom>
+          <a:ln>
+            <a:tailEnd type="triangle"/>
+          </a:ln>
+        </p:spPr>
+        <p:style>
+          <a:lnRef idx="1">
+            <a:schemeClr val="dk1"/>
+          </a:lnRef>
+          <a:fillRef idx="0">
+            <a:schemeClr val="dk1"/>
+          </a:fillRef>
+          <a:effectRef idx="0">
+            <a:schemeClr val="dk1"/>
+          </a:effectRef>
+          <a:fontRef idx="minor">
+            <a:schemeClr val="tx1"/>
+          </a:fontRef>
+        </p:style>
+      </p:cxnSp>
+      <p:cxnSp>
+        <p:nvCxnSpPr>
+          <p:cNvPr id="11" name="Straight Arrow Connector 10">
+            <a:extLst>
+              <a:ext uri="{FF2B5EF4-FFF2-40B4-BE49-F238E27FC236}">
+                <a16:creationId xmlns:a16="http://schemas.microsoft.com/office/drawing/2014/main" id="{24C19E1D-9EAA-495D-9014-6DDE4CB3AEF8}"/>
+              </a:ext>
+            </a:extLst>
+          </p:cNvPr>
+          <p:cNvCxnSpPr/>
+          <p:nvPr/>
+        </p:nvCxnSpPr>
+        <p:spPr>
+          <a:xfrm>
+            <a:off x="3877733" y="3270411"/>
+            <a:ext cx="1583267" cy="0"/>
+          </a:xfrm>
+          <a:prstGeom prst="straightConnector1">
+            <a:avLst/>
+          </a:prstGeom>
+          <a:ln>
+            <a:tailEnd type="triangle"/>
+          </a:ln>
+        </p:spPr>
+        <p:style>
+          <a:lnRef idx="1">
+            <a:schemeClr val="dk1"/>
+          </a:lnRef>
+          <a:fillRef idx="0">
+            <a:schemeClr val="dk1"/>
+          </a:fillRef>
+          <a:effectRef idx="0">
+            <a:schemeClr val="dk1"/>
+          </a:effectRef>
+          <a:fontRef idx="minor">
+            <a:schemeClr val="tx1"/>
+          </a:fontRef>
+        </p:style>
+      </p:cxnSp>
     </p:spTree>
     <p:extLst>
       <p:ext uri="{BB962C8B-B14F-4D97-AF65-F5344CB8AC3E}">

</xml_diff>